<commit_message>
working on lecture 2
</commit_message>
<xml_diff>
--- a/Lecture2_v1.pptx
+++ b/Lecture2_v1.pptx
@@ -5,49 +5,47 @@
     <p:sldMasterId id="2147483648" r:id="rId1"/>
   </p:sldMasterIdLst>
   <p:notesMasterIdLst>
-    <p:notesMasterId r:id="rId25"/>
+    <p:notesMasterId r:id="rId26"/>
   </p:notesMasterIdLst>
   <p:sldIdLst>
     <p:sldId id="256" r:id="rId2"/>
     <p:sldId id="257" r:id="rId3"/>
     <p:sldId id="260" r:id="rId4"/>
-    <p:sldId id="270" r:id="rId5"/>
-    <p:sldId id="271" r:id="rId6"/>
-    <p:sldId id="273" r:id="rId7"/>
-    <p:sldId id="272" r:id="rId8"/>
-    <p:sldId id="268" r:id="rId9"/>
-    <p:sldId id="262" r:id="rId10"/>
-    <p:sldId id="264" r:id="rId11"/>
-    <p:sldId id="265" r:id="rId12"/>
-    <p:sldId id="269" r:id="rId13"/>
-    <p:sldId id="258" r:id="rId14"/>
-    <p:sldId id="259" r:id="rId15"/>
-    <p:sldId id="261" r:id="rId16"/>
-    <p:sldId id="263" r:id="rId17"/>
-    <p:sldId id="266" r:id="rId18"/>
-    <p:sldId id="267" r:id="rId19"/>
-    <p:sldId id="274" r:id="rId20"/>
-    <p:sldId id="275" r:id="rId21"/>
-    <p:sldId id="276" r:id="rId22"/>
-    <p:sldId id="277" r:id="rId23"/>
-    <p:sldId id="278" r:id="rId24"/>
+    <p:sldId id="279" r:id="rId5"/>
+    <p:sldId id="280" r:id="rId6"/>
+    <p:sldId id="271" r:id="rId7"/>
+    <p:sldId id="273" r:id="rId8"/>
+    <p:sldId id="272" r:id="rId9"/>
+    <p:sldId id="268" r:id="rId10"/>
+    <p:sldId id="262" r:id="rId11"/>
+    <p:sldId id="264" r:id="rId12"/>
+    <p:sldId id="265" r:id="rId13"/>
+    <p:sldId id="269" r:id="rId14"/>
+    <p:sldId id="258" r:id="rId15"/>
+    <p:sldId id="259" r:id="rId16"/>
+    <p:sldId id="261" r:id="rId17"/>
+    <p:sldId id="263" r:id="rId18"/>
+    <p:sldId id="266" r:id="rId19"/>
+    <p:sldId id="267" r:id="rId20"/>
+    <p:sldId id="274" r:id="rId21"/>
+    <p:sldId id="275" r:id="rId22"/>
+    <p:sldId id="276" r:id="rId23"/>
+    <p:sldId id="277" r:id="rId24"/>
+    <p:sldId id="278" r:id="rId25"/>
   </p:sldIdLst>
   <p:sldSz cx="12192000" cy="6858000"/>
   <p:notesSz cx="6858000" cy="9144000"/>
   <p:embeddedFontLst>
     <p:embeddedFont>
-      <p:font typeface="Calibri" panose="020F0502020204030204" pitchFamily="34" charset="0"/>
-      <p:regular r:id="rId26"/>
-      <p:bold r:id="rId27"/>
-      <p:italic r:id="rId28"/>
-      <p:boldItalic r:id="rId29"/>
+      <p:font typeface="Cambria Math" panose="02040503050406030204" pitchFamily="18" charset="0"/>
+      <p:regular r:id="rId27"/>
     </p:embeddedFont>
     <p:embeddedFont>
       <p:font typeface="Century Gothic" panose="020B0502020202020204" pitchFamily="34" charset="0"/>
-      <p:regular r:id="rId30"/>
-      <p:bold r:id="rId31"/>
-      <p:italic r:id="rId32"/>
-      <p:boldItalic r:id="rId33"/>
+      <p:regular r:id="rId28"/>
+      <p:bold r:id="rId29"/>
+      <p:italic r:id="rId30"/>
+      <p:boldItalic r:id="rId31"/>
     </p:embeddedFont>
   </p:embeddedFontLst>
   <p:defaultTextStyle>
@@ -284,7 +282,7 @@
       <p15:sldGuideLst xmlns:p15="http://schemas.microsoft.com/office/powerpoint/2012/main"/>
     </p:ext>
     <p:ext uri="GoogleSlidesCustomDataVersion2">
-      <go:slidesCustomData xmlns:go="http://customooxmlschemas.google.com/" xmlns:ahyp="http://schemas.microsoft.com/office/drawing/2018/hyperlinkcolor" xmlns:p15="http://schemas.microsoft.com/office/powerpoint/2012/main" xmlns:p14="http://schemas.microsoft.com/office/powerpoint/2010/main" xmlns:com="http://schemas.openxmlformats.org/drawingml/2006/compatibility" xmlns:pvml="urn:schemas-microsoft-com:office:powerpoint" xmlns:v="urn:schemas-microsoft-com:vml" xmlns:o="urn:schemas-microsoft-com:office:office" xmlns:dgm="http://schemas.openxmlformats.org/drawingml/2006/diagram" xmlns:c="http://schemas.openxmlformats.org/drawingml/2006/chart" xmlns:mv="urn:schemas-microsoft-com:mac:vml" xmlns:mc="http://schemas.openxmlformats.org/markup-compatibility/2006" xmlns="" r:id="rId38" roundtripDataSignature="AMtx7mhEk3kr15p5MvOwX8Siehu9UxAE2A=="/>
+      <go:slidesCustomData xmlns="" xmlns:mc="http://schemas.openxmlformats.org/markup-compatibility/2006" xmlns:mv="urn:schemas-microsoft-com:mac:vml" xmlns:c="http://schemas.openxmlformats.org/drawingml/2006/chart" xmlns:dgm="http://schemas.openxmlformats.org/drawingml/2006/diagram" xmlns:o="urn:schemas-microsoft-com:office:office" xmlns:v="urn:schemas-microsoft-com:vml" xmlns:pvml="urn:schemas-microsoft-com:office:powerpoint" xmlns:com="http://schemas.openxmlformats.org/drawingml/2006/compatibility" xmlns:p14="http://schemas.microsoft.com/office/powerpoint/2010/main" xmlns:p15="http://schemas.microsoft.com/office/powerpoint/2012/main" xmlns:ahyp="http://schemas.microsoft.com/office/drawing/2018/hyperlinkcolor" xmlns:go="http://customooxmlschemas.google.com/" r:id="rId38" roundtripDataSignature="AMtx7mhEk3kr15p5MvOwX8Siehu9UxAE2A=="/>
     </p:ext>
   </p:extLst>
 </p:presentation>
@@ -1737,6 +1735,126 @@
           <a:p>
             <a:r>
               <a:rPr lang="en-US" dirty="0"/>
+              <a:t>Ask them here, what is a </a:t>
+            </a:r>
+            <a:r>
+              <a:rPr lang="en-US" dirty="0" err="1"/>
+              <a:t>pvalue</a:t>
+            </a:r>
+            <a:r>
+              <a:rPr lang="en-US" dirty="0"/>
+              <a:t>?!?</a:t>
+            </a:r>
+          </a:p>
+        </p:txBody>
+      </p:sp>
+      <p:sp>
+        <p:nvSpPr>
+          <p:cNvPr id="4" name="Slide Number Placeholder 3"/>
+          <p:cNvSpPr>
+            <a:spLocks noGrp="1"/>
+          </p:cNvSpPr>
+          <p:nvPr>
+            <p:ph type="sldNum" idx="12"/>
+          </p:nvPr>
+        </p:nvSpPr>
+        <p:spPr/>
+        <p:txBody>
+          <a:bodyPr/>
+          <a:lstStyle/>
+          <a:p>
+            <a:pPr marL="0" marR="0" lvl="0" indent="0" algn="r" rtl="0">
+              <a:spcBef>
+                <a:spcPts val="0"/>
+              </a:spcBef>
+              <a:spcAft>
+                <a:spcPts val="0"/>
+              </a:spcAft>
+              <a:buNone/>
+            </a:pPr>
+            <a:fld id="{00000000-1234-1234-1234-123412341234}" type="slidenum">
+              <a:rPr lang="en-US" sz="1200" b="0" i="0" u="none" strike="noStrike" cap="none" smtClean="0">
+                <a:solidFill>
+                  <a:schemeClr val="dk1"/>
+                </a:solidFill>
+                <a:latin typeface="Calibri"/>
+                <a:ea typeface="Calibri"/>
+                <a:cs typeface="Calibri"/>
+                <a:sym typeface="Calibri"/>
+              </a:rPr>
+              <a:t>5</a:t>
+            </a:fld>
+            <a:endParaRPr lang="en-US" sz="1200" b="0" i="0" u="none" strike="noStrike" cap="none">
+              <a:solidFill>
+                <a:schemeClr val="dk1"/>
+              </a:solidFill>
+              <a:latin typeface="Calibri"/>
+              <a:ea typeface="Calibri"/>
+              <a:cs typeface="Calibri"/>
+              <a:sym typeface="Calibri"/>
+            </a:endParaRPr>
+          </a:p>
+        </p:txBody>
+      </p:sp>
+    </p:spTree>
+    <p:extLst>
+      <p:ext uri="{BB962C8B-B14F-4D97-AF65-F5344CB8AC3E}">
+        <p14:creationId xmlns:p14="http://schemas.microsoft.com/office/powerpoint/2010/main" val="82590717"/>
+      </p:ext>
+    </p:extLst>
+  </p:cSld>
+  <p:clrMapOvr>
+    <a:masterClrMapping/>
+  </p:clrMapOvr>
+</p:notes>
+</file>
+
+<file path=ppt/notesSlides/notesSlide4.xml><?xml version="1.0" encoding="utf-8"?>
+<p:notes xmlns:a="http://schemas.openxmlformats.org/drawingml/2006/main" xmlns:r="http://schemas.openxmlformats.org/officeDocument/2006/relationships" xmlns:p="http://schemas.openxmlformats.org/presentationml/2006/main">
+  <p:cSld>
+    <p:spTree>
+      <p:nvGrpSpPr>
+        <p:cNvPr id="1" name=""/>
+        <p:cNvGrpSpPr/>
+        <p:nvPr/>
+      </p:nvGrpSpPr>
+      <p:grpSpPr>
+        <a:xfrm>
+          <a:off x="0" y="0"/>
+          <a:ext cx="0" cy="0"/>
+          <a:chOff x="0" y="0"/>
+          <a:chExt cx="0" cy="0"/>
+        </a:xfrm>
+      </p:grpSpPr>
+      <p:sp>
+        <p:nvSpPr>
+          <p:cNvPr id="2" name="Slide Image Placeholder 1"/>
+          <p:cNvSpPr>
+            <a:spLocks noGrp="1" noRot="1" noChangeAspect="1"/>
+          </p:cNvSpPr>
+          <p:nvPr>
+            <p:ph type="sldImg"/>
+          </p:nvPr>
+        </p:nvSpPr>
+        <p:spPr/>
+      </p:sp>
+      <p:sp>
+        <p:nvSpPr>
+          <p:cNvPr id="3" name="Notes Placeholder 2"/>
+          <p:cNvSpPr>
+            <a:spLocks noGrp="1"/>
+          </p:cNvSpPr>
+          <p:nvPr>
+            <p:ph type="body" idx="1"/>
+          </p:nvPr>
+        </p:nvSpPr>
+        <p:spPr/>
+        <p:txBody>
+          <a:bodyPr/>
+          <a:lstStyle/>
+          <a:p>
+            <a:r>
+              <a:rPr lang="en-US" dirty="0"/>
               <a:t>We will draw these prediction graphs more than once during this class – we’re not going for perfect, we’re going for learning. </a:t>
             </a:r>
           </a:p>
@@ -1776,7 +1894,7 @@
                 <a:cs typeface="Calibri"/>
                 <a:sym typeface="Calibri"/>
               </a:rPr>
-              <a:t>6</a:t>
+              <a:t>7</a:t>
             </a:fld>
             <a:endParaRPr lang="en-US" sz="1200" b="0" i="0" u="none" strike="noStrike" cap="none">
               <a:solidFill>
@@ -1803,7 +1921,7 @@
 </p:notes>
 </file>
 
-<file path=ppt/notesSlides/notesSlide4.xml><?xml version="1.0" encoding="utf-8"?>
+<file path=ppt/notesSlides/notesSlide5.xml><?xml version="1.0" encoding="utf-8"?>
 <p:notes xmlns:a="http://schemas.openxmlformats.org/drawingml/2006/main" xmlns:r="http://schemas.openxmlformats.org/officeDocument/2006/relationships" xmlns:p="http://schemas.openxmlformats.org/presentationml/2006/main">
   <p:cSld>
     <p:spTree>
@@ -1885,7 +2003,7 @@
                 <a:cs typeface="Calibri"/>
                 <a:sym typeface="Calibri"/>
               </a:rPr>
-              <a:t>21</a:t>
+              <a:t>22</a:t>
             </a:fld>
             <a:endParaRPr lang="en-US" sz="1200" b="0" i="0" u="none" strike="noStrike" cap="none">
               <a:solidFill>
@@ -19493,6 +19611,265 @@
           <p:cNvPr id="2" name="Title 1">
             <a:extLst>
               <a:ext uri="{FF2B5EF4-FFF2-40B4-BE49-F238E27FC236}">
+                <a16:creationId xmlns:a16="http://schemas.microsoft.com/office/drawing/2014/main" id="{ECF3D682-41BC-A540-9EA3-A7D85DCC8270}"/>
+              </a:ext>
+            </a:extLst>
+          </p:cNvPr>
+          <p:cNvSpPr>
+            <a:spLocks noGrp="1"/>
+          </p:cNvSpPr>
+          <p:nvPr>
+            <p:ph type="title"/>
+          </p:nvPr>
+        </p:nvSpPr>
+        <p:spPr/>
+        <p:txBody>
+          <a:bodyPr/>
+          <a:lstStyle/>
+          <a:p>
+            <a:r>
+              <a:rPr lang="en-US" dirty="0"/>
+              <a:t>Normal/Gaussian</a:t>
+            </a:r>
+          </a:p>
+        </p:txBody>
+      </p:sp>
+      <mc:AlternateContent xmlns:mc="http://schemas.openxmlformats.org/markup-compatibility/2006">
+        <mc:Choice xmlns:a14="http://schemas.microsoft.com/office/drawing/2010/main" Requires="a14">
+          <p:sp>
+            <p:nvSpPr>
+              <p:cNvPr id="5" name="Text Placeholder 4">
+                <a:extLst>
+                  <a:ext uri="{FF2B5EF4-FFF2-40B4-BE49-F238E27FC236}">
+                    <a16:creationId xmlns:a16="http://schemas.microsoft.com/office/drawing/2014/main" id="{ADFE0451-EBE1-7280-A9E1-D8828E1444C3}"/>
+                  </a:ext>
+                </a:extLst>
+              </p:cNvPr>
+              <p:cNvSpPr>
+                <a:spLocks noGrp="1"/>
+              </p:cNvSpPr>
+              <p:nvPr>
+                <p:ph type="body" idx="1"/>
+              </p:nvPr>
+            </p:nvSpPr>
+            <p:spPr>
+              <a:xfrm>
+                <a:off x="2589212" y="2133600"/>
+                <a:ext cx="3792927" cy="3777622"/>
+              </a:xfrm>
+            </p:spPr>
+            <p:txBody>
+              <a:bodyPr/>
+              <a:lstStyle/>
+              <a:p>
+                <a:r>
+                  <a:rPr lang="en-US" dirty="0"/>
+                  <a:t>Bell Curve</a:t>
+                </a:r>
+              </a:p>
+              <a:p>
+                <a:r>
+                  <a:rPr lang="en-US" dirty="0"/>
+                  <a:t>Parameter mu </a:t>
+                </a:r>
+                <a14:m>
+                  <m:oMath xmlns:m="http://schemas.openxmlformats.org/officeDocument/2006/math">
+                    <m:r>
+                      <a:rPr lang="en-US" i="1" smtClean="0">
+                        <a:latin typeface="Cambria Math" panose="02040503050406030204" pitchFamily="18" charset="0"/>
+                        <a:ea typeface="Cambria Math" panose="02040503050406030204" pitchFamily="18" charset="0"/>
+                      </a:rPr>
+                      <m:t>𝜇</m:t>
+                    </m:r>
+                  </m:oMath>
+                </a14:m>
+                <a:r>
+                  <a:rPr lang="en-US" dirty="0"/>
+                  <a:t> is the mean, parameter </a:t>
+                </a:r>
+                <a14:m>
+                  <m:oMath xmlns:m="http://schemas.openxmlformats.org/officeDocument/2006/math">
+                    <m:r>
+                      <a:rPr lang="en-US" i="1" smtClean="0">
+                        <a:latin typeface="Cambria Math" panose="02040503050406030204" pitchFamily="18" charset="0"/>
+                        <a:ea typeface="Cambria Math" panose="02040503050406030204" pitchFamily="18" charset="0"/>
+                      </a:rPr>
+                      <m:t>𝜎</m:t>
+                    </m:r>
+                  </m:oMath>
+                </a14:m>
+                <a:r>
+                  <a:rPr lang="en-US" baseline="30000" dirty="0"/>
+                  <a:t>2 </a:t>
+                </a:r>
+                <a:r>
+                  <a:rPr lang="en-US" dirty="0"/>
+                  <a:t>is the variance (</a:t>
+                </a:r>
+                <a14:m>
+                  <m:oMath xmlns:m="http://schemas.openxmlformats.org/officeDocument/2006/math">
+                    <m:r>
+                      <a:rPr lang="en-US" i="1">
+                        <a:latin typeface="Cambria Math" panose="02040503050406030204" pitchFamily="18" charset="0"/>
+                        <a:ea typeface="Cambria Math" panose="02040503050406030204" pitchFamily="18" charset="0"/>
+                      </a:rPr>
+                      <m:t>𝜎</m:t>
+                    </m:r>
+                  </m:oMath>
+                </a14:m>
+                <a:r>
+                  <a:rPr lang="en-US" dirty="0"/>
+                  <a:t> is the standard deviation)</a:t>
+                </a:r>
+              </a:p>
+              <a:p>
+                <a:r>
+                  <a:rPr lang="en-US" dirty="0"/>
+                  <a:t>Often start with a </a:t>
+                </a:r>
+                <a14:m>
+                  <m:oMath xmlns:m="http://schemas.openxmlformats.org/officeDocument/2006/math">
+                    <m:r>
+                      <a:rPr lang="en-US" i="1" smtClean="0">
+                        <a:latin typeface="Cambria Math" panose="02040503050406030204" pitchFamily="18" charset="0"/>
+                        <a:ea typeface="Cambria Math" panose="02040503050406030204" pitchFamily="18" charset="0"/>
+                      </a:rPr>
+                      <m:t>𝜇</m:t>
+                    </m:r>
+                  </m:oMath>
+                </a14:m>
+                <a:r>
+                  <a:rPr lang="en-US" dirty="0"/>
+                  <a:t> = 0, </a:t>
+                </a:r>
+                <a14:m>
+                  <m:oMath xmlns:m="http://schemas.openxmlformats.org/officeDocument/2006/math">
+                    <m:r>
+                      <a:rPr lang="en-US" i="1">
+                        <a:latin typeface="Cambria Math" panose="02040503050406030204" pitchFamily="18" charset="0"/>
+                        <a:ea typeface="Cambria Math" panose="02040503050406030204" pitchFamily="18" charset="0"/>
+                      </a:rPr>
+                      <m:t>𝜎</m:t>
+                    </m:r>
+                  </m:oMath>
+                </a14:m>
+                <a:r>
+                  <a:rPr lang="en-US" dirty="0"/>
+                  <a:t> =1</a:t>
+                </a:r>
+              </a:p>
+            </p:txBody>
+          </p:sp>
+        </mc:Choice>
+        <mc:Fallback>
+          <p:sp>
+            <p:nvSpPr>
+              <p:cNvPr id="5" name="Text Placeholder 4">
+                <a:extLst>
+                  <a:ext uri="{FF2B5EF4-FFF2-40B4-BE49-F238E27FC236}">
+                    <a16:creationId xmlns:a16="http://schemas.microsoft.com/office/drawing/2014/main" id="{ADFE0451-EBE1-7280-A9E1-D8828E1444C3}"/>
+                  </a:ext>
+                </a:extLst>
+              </p:cNvPr>
+              <p:cNvSpPr>
+                <a:spLocks noGrp="1" noRot="1" noChangeAspect="1" noMove="1" noResize="1" noEditPoints="1" noAdjustHandles="1" noChangeArrowheads="1" noChangeShapeType="1" noTextEdit="1"/>
+              </p:cNvSpPr>
+              <p:nvPr>
+                <p:ph type="body" idx="1"/>
+              </p:nvPr>
+            </p:nvSpPr>
+            <p:spPr>
+              <a:xfrm>
+                <a:off x="2589212" y="2133600"/>
+                <a:ext cx="3792927" cy="3777622"/>
+              </a:xfrm>
+              <a:blipFill>
+                <a:blip r:embed="rId2"/>
+                <a:stretch>
+                  <a:fillRect/>
+                </a:stretch>
+              </a:blipFill>
+            </p:spPr>
+            <p:txBody>
+              <a:bodyPr/>
+              <a:lstStyle/>
+              <a:p>
+                <a:r>
+                  <a:rPr lang="en-US">
+                    <a:noFill/>
+                  </a:rPr>
+                  <a:t> </a:t>
+                </a:r>
+              </a:p>
+            </p:txBody>
+          </p:sp>
+        </mc:Fallback>
+      </mc:AlternateContent>
+      <p:pic>
+        <p:nvPicPr>
+          <p:cNvPr id="7" name="Picture 6">
+            <a:extLst>
+              <a:ext uri="{FF2B5EF4-FFF2-40B4-BE49-F238E27FC236}">
+                <a16:creationId xmlns:a16="http://schemas.microsoft.com/office/drawing/2014/main" id="{E874038E-F36A-3413-CC68-63EBECE697B5}"/>
+              </a:ext>
+            </a:extLst>
+          </p:cNvPr>
+          <p:cNvPicPr>
+            <a:picLocks noChangeAspect="1"/>
+          </p:cNvPicPr>
+          <p:nvPr/>
+        </p:nvPicPr>
+        <p:blipFill>
+          <a:blip r:embed="rId3"/>
+          <a:stretch>
+            <a:fillRect/>
+          </a:stretch>
+        </p:blipFill>
+        <p:spPr>
+          <a:xfrm>
+            <a:off x="6564923" y="1600200"/>
+            <a:ext cx="5486400" cy="3657600"/>
+          </a:xfrm>
+          <a:prstGeom prst="rect">
+            <a:avLst/>
+          </a:prstGeom>
+        </p:spPr>
+      </p:pic>
+    </p:spTree>
+    <p:extLst>
+      <p:ext uri="{BB962C8B-B14F-4D97-AF65-F5344CB8AC3E}">
+        <p14:creationId xmlns:p14="http://schemas.microsoft.com/office/powerpoint/2010/main" val="94847923"/>
+      </p:ext>
+    </p:extLst>
+  </p:cSld>
+  <p:clrMapOvr>
+    <a:masterClrMapping/>
+  </p:clrMapOvr>
+</p:sld>
+</file>
+
+<file path=ppt/slides/slide11.xml><?xml version="1.0" encoding="utf-8"?>
+<p:sld xmlns:a="http://schemas.openxmlformats.org/drawingml/2006/main" xmlns:r="http://schemas.openxmlformats.org/officeDocument/2006/relationships" xmlns:p="http://schemas.openxmlformats.org/presentationml/2006/main">
+  <p:cSld>
+    <p:spTree>
+      <p:nvGrpSpPr>
+        <p:cNvPr id="1" name=""/>
+        <p:cNvGrpSpPr/>
+        <p:nvPr/>
+      </p:nvGrpSpPr>
+      <p:grpSpPr>
+        <a:xfrm>
+          <a:off x="0" y="0"/>
+          <a:ext cx="0" cy="0"/>
+          <a:chOff x="0" y="0"/>
+          <a:chExt cx="0" cy="0"/>
+        </a:xfrm>
+      </p:grpSpPr>
+      <p:sp>
+        <p:nvSpPr>
+          <p:cNvPr id="2" name="Title 1">
+            <a:extLst>
+              <a:ext uri="{FF2B5EF4-FFF2-40B4-BE49-F238E27FC236}">
                 <a16:creationId xmlns:a16="http://schemas.microsoft.com/office/drawing/2014/main" id="{AB904151-74E3-0B42-AAE0-08C2747B3E9A}"/>
               </a:ext>
             </a:extLst>
@@ -19516,31 +19893,154 @@
           </a:p>
         </p:txBody>
       </p:sp>
-      <p:sp>
-        <p:nvSpPr>
-          <p:cNvPr id="3" name="Text Placeholder 2">
+      <mc:AlternateContent xmlns:mc="http://schemas.openxmlformats.org/markup-compatibility/2006">
+        <mc:Choice xmlns:a14="http://schemas.microsoft.com/office/drawing/2010/main" Requires="a14">
+          <p:sp>
+            <p:nvSpPr>
+              <p:cNvPr id="3" name="Text Placeholder 2">
+                <a:extLst>
+                  <a:ext uri="{FF2B5EF4-FFF2-40B4-BE49-F238E27FC236}">
+                    <a16:creationId xmlns:a16="http://schemas.microsoft.com/office/drawing/2014/main" id="{A8F5A466-6212-3B4A-B660-03A3E09AD07E}"/>
+                  </a:ext>
+                </a:extLst>
+              </p:cNvPr>
+              <p:cNvSpPr>
+                <a:spLocks noGrp="1"/>
+              </p:cNvSpPr>
+              <p:nvPr>
+                <p:ph type="body" idx="1"/>
+              </p:nvPr>
+            </p:nvSpPr>
+            <p:spPr>
+              <a:xfrm>
+                <a:off x="2589212" y="2133600"/>
+                <a:ext cx="4503250" cy="3777622"/>
+              </a:xfrm>
+            </p:spPr>
+            <p:txBody>
+              <a:bodyPr/>
+              <a:lstStyle/>
+              <a:p>
+                <a:r>
+                  <a:rPr lang="en-US" dirty="0"/>
+                  <a:t>Probability distribution of distance between events</a:t>
+                </a:r>
+              </a:p>
+              <a:p>
+                <a:r>
+                  <a:rPr lang="en-US" dirty="0"/>
+                  <a:t>Special case of the gamma</a:t>
+                </a:r>
+              </a:p>
+              <a:p>
+                <a:r>
+                  <a:rPr lang="en-US" dirty="0"/>
+                  <a:t>‘How long until a specific event happens?’</a:t>
+                </a:r>
+              </a:p>
+              <a:p>
+                <a:pPr lvl="1"/>
+                <a:r>
+                  <a:rPr lang="en-US" dirty="0"/>
+                  <a:t>Given constant probability per unit time (parameter lambda </a:t>
+                </a:r>
+                <a14:m>
+                  <m:oMath xmlns:m="http://schemas.openxmlformats.org/officeDocument/2006/math">
+                    <m:r>
+                      <a:rPr lang="en-US" i="1" smtClean="0">
+                        <a:latin typeface="Cambria Math" panose="02040503050406030204" pitchFamily="18" charset="0"/>
+                        <a:ea typeface="Cambria Math" panose="02040503050406030204" pitchFamily="18" charset="0"/>
+                      </a:rPr>
+                      <m:t>𝜆</m:t>
+                    </m:r>
+                    <m:r>
+                      <a:rPr lang="en-US" b="0" i="1" smtClean="0">
+                        <a:latin typeface="Cambria Math" panose="02040503050406030204" pitchFamily="18" charset="0"/>
+                        <a:ea typeface="Cambria Math" panose="02040503050406030204" pitchFamily="18" charset="0"/>
+                      </a:rPr>
+                      <m:t>)</m:t>
+                    </m:r>
+                  </m:oMath>
+                </a14:m>
+                <a:endParaRPr lang="en-US" dirty="0"/>
+              </a:p>
+            </p:txBody>
+          </p:sp>
+        </mc:Choice>
+        <mc:Fallback>
+          <p:sp>
+            <p:nvSpPr>
+              <p:cNvPr id="3" name="Text Placeholder 2">
+                <a:extLst>
+                  <a:ext uri="{FF2B5EF4-FFF2-40B4-BE49-F238E27FC236}">
+                    <a16:creationId xmlns:a16="http://schemas.microsoft.com/office/drawing/2014/main" id="{A8F5A466-6212-3B4A-B660-03A3E09AD07E}"/>
+                  </a:ext>
+                </a:extLst>
+              </p:cNvPr>
+              <p:cNvSpPr>
+                <a:spLocks noGrp="1" noRot="1" noChangeAspect="1" noMove="1" noResize="1" noEditPoints="1" noAdjustHandles="1" noChangeArrowheads="1" noChangeShapeType="1" noTextEdit="1"/>
+              </p:cNvSpPr>
+              <p:nvPr>
+                <p:ph type="body" idx="1"/>
+              </p:nvPr>
+            </p:nvSpPr>
+            <p:spPr>
+              <a:xfrm>
+                <a:off x="2589212" y="2133600"/>
+                <a:ext cx="4503250" cy="3777622"/>
+              </a:xfrm>
+              <a:blipFill>
+                <a:blip r:embed="rId2"/>
+                <a:stretch>
+                  <a:fillRect/>
+                </a:stretch>
+              </a:blipFill>
+            </p:spPr>
+            <p:txBody>
+              <a:bodyPr/>
+              <a:lstStyle/>
+              <a:p>
+                <a:r>
+                  <a:rPr lang="en-US">
+                    <a:noFill/>
+                  </a:rPr>
+                  <a:t> </a:t>
+                </a:r>
+              </a:p>
+            </p:txBody>
+          </p:sp>
+        </mc:Fallback>
+      </mc:AlternateContent>
+      <p:pic>
+        <p:nvPicPr>
+          <p:cNvPr id="5" name="Picture 4">
             <a:extLst>
               <a:ext uri="{FF2B5EF4-FFF2-40B4-BE49-F238E27FC236}">
-                <a16:creationId xmlns:a16="http://schemas.microsoft.com/office/drawing/2014/main" id="{A8F5A466-6212-3B4A-B660-03A3E09AD07E}"/>
+                <a16:creationId xmlns:a16="http://schemas.microsoft.com/office/drawing/2014/main" id="{2501FC4F-9592-FF8C-5CD5-702383637B18}"/>
               </a:ext>
             </a:extLst>
           </p:cNvPr>
-          <p:cNvSpPr>
-            <a:spLocks noGrp="1"/>
-          </p:cNvSpPr>
-          <p:nvPr>
-            <p:ph type="body" idx="1"/>
-          </p:nvPr>
-        </p:nvSpPr>
-        <p:spPr/>
-        <p:txBody>
-          <a:bodyPr/>
-          <a:lstStyle/>
-          <a:p>
-            <a:endParaRPr lang="en-US"/>
-          </a:p>
-        </p:txBody>
-      </p:sp>
+          <p:cNvPicPr>
+            <a:picLocks noChangeAspect="1"/>
+          </p:cNvPicPr>
+          <p:nvPr/>
+        </p:nvPicPr>
+        <p:blipFill>
+          <a:blip r:embed="rId3"/>
+          <a:stretch>
+            <a:fillRect/>
+          </a:stretch>
+        </p:blipFill>
+        <p:spPr>
+          <a:xfrm>
+            <a:off x="7408984" y="1600200"/>
+            <a:ext cx="4783015" cy="3657600"/>
+          </a:xfrm>
+          <a:prstGeom prst="rect">
+            <a:avLst/>
+          </a:prstGeom>
+        </p:spPr>
+      </p:pic>
     </p:spTree>
     <p:extLst>
       <p:ext uri="{BB962C8B-B14F-4D97-AF65-F5344CB8AC3E}">
@@ -19554,7 +20054,7 @@
 </p:sld>
 </file>
 
-<file path=ppt/slides/slide11.xml><?xml version="1.0" encoding="utf-8"?>
+<file path=ppt/slides/slide12.xml><?xml version="1.0" encoding="utf-8"?>
 <p:sld xmlns:a="http://schemas.openxmlformats.org/drawingml/2006/main" xmlns:r="http://schemas.openxmlformats.org/officeDocument/2006/relationships" xmlns:p="http://schemas.openxmlformats.org/presentationml/2006/main">
   <p:cSld>
     <p:spTree>
@@ -19620,7 +20120,7 @@
           <a:bodyPr/>
           <a:lstStyle/>
           <a:p>
-            <a:endParaRPr lang="en-US"/>
+            <a:endParaRPr lang="en-US" dirty="0"/>
           </a:p>
         </p:txBody>
       </p:sp>
@@ -19637,7 +20137,7 @@
 </p:sld>
 </file>
 
-<file path=ppt/slides/slide12.xml><?xml version="1.0" encoding="utf-8"?>
+<file path=ppt/slides/slide13.xml><?xml version="1.0" encoding="utf-8"?>
 <p:sld xmlns:a="http://schemas.openxmlformats.org/drawingml/2006/main" xmlns:r="http://schemas.openxmlformats.org/officeDocument/2006/relationships" xmlns:p="http://schemas.openxmlformats.org/presentationml/2006/main">
   <p:cSld>
     <p:spTree>
@@ -19723,7 +20223,7 @@
 </p:sld>
 </file>
 
-<file path=ppt/slides/slide13.xml><?xml version="1.0" encoding="utf-8"?>
+<file path=ppt/slides/slide14.xml><?xml version="1.0" encoding="utf-8"?>
 <p:sld xmlns:a="http://schemas.openxmlformats.org/drawingml/2006/main" xmlns:r="http://schemas.openxmlformats.org/officeDocument/2006/relationships" xmlns:p="http://schemas.openxmlformats.org/presentationml/2006/main">
   <p:cSld>
     <p:spTree>
@@ -19806,7 +20306,7 @@
 </p:sld>
 </file>
 
-<file path=ppt/slides/slide14.xml><?xml version="1.0" encoding="utf-8"?>
+<file path=ppt/slides/slide15.xml><?xml version="1.0" encoding="utf-8"?>
 <p:sld xmlns:a="http://schemas.openxmlformats.org/drawingml/2006/main" xmlns:r="http://schemas.openxmlformats.org/officeDocument/2006/relationships" xmlns:p="http://schemas.openxmlformats.org/presentationml/2006/main">
   <p:cSld>
     <p:spTree>
@@ -19872,7 +20372,10 @@
           <a:bodyPr/>
           <a:lstStyle/>
           <a:p>
-            <a:endParaRPr lang="en-US"/>
+            <a:r>
+              <a:rPr lang="en-US" dirty="0"/>
+              <a:t>Discrete analogue of the exponential</a:t>
+            </a:r>
           </a:p>
         </p:txBody>
       </p:sp>
@@ -19889,7 +20392,7 @@
 </p:sld>
 </file>
 
-<file path=ppt/slides/slide15.xml><?xml version="1.0" encoding="utf-8"?>
+<file path=ppt/slides/slide16.xml><?xml version="1.0" encoding="utf-8"?>
 <p:sld xmlns:a="http://schemas.openxmlformats.org/drawingml/2006/main" xmlns:r="http://schemas.openxmlformats.org/officeDocument/2006/relationships" xmlns:p="http://schemas.openxmlformats.org/presentationml/2006/main">
   <p:cSld>
     <p:spTree>
@@ -19955,7 +20458,10 @@
           <a:bodyPr/>
           <a:lstStyle/>
           <a:p>
-            <a:endParaRPr lang="en-US"/>
+            <a:r>
+              <a:rPr lang="en-US" dirty="0"/>
+              <a:t>Discrete analogue to the gamma distribution</a:t>
+            </a:r>
           </a:p>
         </p:txBody>
       </p:sp>
@@ -19972,7 +20478,7 @@
 </p:sld>
 </file>
 
-<file path=ppt/slides/slide16.xml><?xml version="1.0" encoding="utf-8"?>
+<file path=ppt/slides/slide17.xml><?xml version="1.0" encoding="utf-8"?>
 <p:sld xmlns:a="http://schemas.openxmlformats.org/drawingml/2006/main" xmlns:r="http://schemas.openxmlformats.org/officeDocument/2006/relationships" xmlns:p="http://schemas.openxmlformats.org/presentationml/2006/main">
   <p:cSld>
     <p:spTree>
@@ -20055,7 +20561,7 @@
 </p:sld>
 </file>
 
-<file path=ppt/slides/slide17.xml><?xml version="1.0" encoding="utf-8"?>
+<file path=ppt/slides/slide18.xml><?xml version="1.0" encoding="utf-8"?>
 <p:sld xmlns:a="http://schemas.openxmlformats.org/drawingml/2006/main" xmlns:r="http://schemas.openxmlformats.org/officeDocument/2006/relationships" xmlns:p="http://schemas.openxmlformats.org/presentationml/2006/main">
   <p:cSld>
     <p:spTree>
@@ -20138,7 +20644,7 @@
 </p:sld>
 </file>
 
-<file path=ppt/slides/slide18.xml><?xml version="1.0" encoding="utf-8"?>
+<file path=ppt/slides/slide19.xml><?xml version="1.0" encoding="utf-8"?>
 <p:sld xmlns:a="http://schemas.openxmlformats.org/drawingml/2006/main" xmlns:r="http://schemas.openxmlformats.org/officeDocument/2006/relationships" xmlns:p="http://schemas.openxmlformats.org/presentationml/2006/main">
   <p:cSld>
     <p:spTree>
@@ -20221,7 +20727,212 @@
 </p:sld>
 </file>
 
-<file path=ppt/slides/slide19.xml><?xml version="1.0" encoding="utf-8"?>
+<file path=ppt/slides/slide2.xml><?xml version="1.0" encoding="utf-8"?>
+<p:sld xmlns:a="http://schemas.openxmlformats.org/drawingml/2006/main" xmlns:r="http://schemas.openxmlformats.org/officeDocument/2006/relationships" xmlns:p="http://schemas.openxmlformats.org/presentationml/2006/main">
+  <p:cSld>
+    <p:spTree>
+      <p:nvGrpSpPr>
+        <p:cNvPr id="1" name="Shape 173"/>
+        <p:cNvGrpSpPr/>
+        <p:nvPr/>
+      </p:nvGrpSpPr>
+      <p:grpSpPr>
+        <a:xfrm>
+          <a:off x="0" y="0"/>
+          <a:ext cx="0" cy="0"/>
+          <a:chOff x="0" y="0"/>
+          <a:chExt cx="0" cy="0"/>
+        </a:xfrm>
+      </p:grpSpPr>
+      <p:sp>
+        <p:nvSpPr>
+          <p:cNvPr id="174" name="Google Shape;174;p2"/>
+          <p:cNvSpPr txBox="1">
+            <a:spLocks noGrp="1"/>
+          </p:cNvSpPr>
+          <p:nvPr>
+            <p:ph type="title"/>
+          </p:nvPr>
+        </p:nvSpPr>
+        <p:spPr>
+          <a:xfrm>
+            <a:off x="2592925" y="624110"/>
+            <a:ext cx="8911687" cy="1280890"/>
+          </a:xfrm>
+          <a:prstGeom prst="rect">
+            <a:avLst/>
+          </a:prstGeom>
+          <a:noFill/>
+          <a:ln>
+            <a:noFill/>
+          </a:ln>
+        </p:spPr>
+        <p:txBody>
+          <a:bodyPr spcFirstLastPara="1" wrap="square" lIns="91425" tIns="45700" rIns="91425" bIns="45700" anchor="t" anchorCtr="0">
+            <a:normAutofit/>
+          </a:bodyPr>
+          <a:lstStyle/>
+          <a:p>
+            <a:pPr marL="0" lvl="0" indent="0" algn="l" rtl="0">
+              <a:spcBef>
+                <a:spcPts val="0"/>
+              </a:spcBef>
+              <a:spcAft>
+                <a:spcPts val="0"/>
+              </a:spcAft>
+              <a:buClr>
+                <a:srgbClr val="262626"/>
+              </a:buClr>
+              <a:buSzPts val="3600"/>
+              <a:buFont typeface="Century Gothic"/>
+              <a:buNone/>
+            </a:pPr>
+            <a:r>
+              <a:rPr lang="en-US"/>
+              <a:t>Today we’re going to:</a:t>
+            </a:r>
+            <a:endParaRPr/>
+          </a:p>
+        </p:txBody>
+      </p:sp>
+      <p:sp>
+        <p:nvSpPr>
+          <p:cNvPr id="175" name="Google Shape;175;p2"/>
+          <p:cNvSpPr txBox="1">
+            <a:spLocks noGrp="1"/>
+          </p:cNvSpPr>
+          <p:nvPr>
+            <p:ph type="body" idx="1"/>
+          </p:nvPr>
+        </p:nvSpPr>
+        <p:spPr>
+          <a:xfrm>
+            <a:off x="2589212" y="2133600"/>
+            <a:ext cx="8915400" cy="3777622"/>
+          </a:xfrm>
+          <a:prstGeom prst="rect">
+            <a:avLst/>
+          </a:prstGeom>
+          <a:noFill/>
+          <a:ln>
+            <a:noFill/>
+          </a:ln>
+        </p:spPr>
+        <p:txBody>
+          <a:bodyPr spcFirstLastPara="1" wrap="square" lIns="91425" tIns="45700" rIns="91425" bIns="45700" anchor="t" anchorCtr="0">
+            <a:normAutofit/>
+          </a:bodyPr>
+          <a:lstStyle/>
+          <a:p>
+            <a:pPr marL="342900" lvl="0" indent="-342900" algn="l" rtl="0">
+              <a:spcBef>
+                <a:spcPts val="0"/>
+              </a:spcBef>
+              <a:spcAft>
+                <a:spcPts val="0"/>
+              </a:spcAft>
+              <a:buSzPts val="1800"/>
+              <a:buChar char="🠶"/>
+            </a:pPr>
+            <a:r>
+              <a:rPr lang="en-US" dirty="0"/>
+              <a:t>Talk about distributions</a:t>
+            </a:r>
+            <a:endParaRPr dirty="0"/>
+          </a:p>
+          <a:p>
+            <a:pPr marL="342900" lvl="0" indent="-342900" algn="l" rtl="0">
+              <a:spcBef>
+                <a:spcPts val="1000"/>
+              </a:spcBef>
+              <a:spcAft>
+                <a:spcPts val="0"/>
+              </a:spcAft>
+              <a:buSzPts val="1800"/>
+              <a:buChar char="🠶"/>
+            </a:pPr>
+            <a:r>
+              <a:rPr lang="en-US" dirty="0"/>
+              <a:t>Discuss how to decide on a distribution</a:t>
+            </a:r>
+            <a:endParaRPr dirty="0"/>
+          </a:p>
+          <a:p>
+            <a:pPr marL="342900" lvl="0" indent="-342900" algn="l" rtl="0">
+              <a:spcBef>
+                <a:spcPts val="1000"/>
+              </a:spcBef>
+              <a:spcAft>
+                <a:spcPts val="0"/>
+              </a:spcAft>
+              <a:buSzPts val="1800"/>
+              <a:buChar char="🠶"/>
+            </a:pPr>
+            <a:r>
+              <a:rPr lang="en-US" dirty="0"/>
+              <a:t>Talk about likelihood</a:t>
+            </a:r>
+          </a:p>
+          <a:p>
+            <a:pPr marL="342900" lvl="0" indent="-342900" algn="l" rtl="0">
+              <a:spcBef>
+                <a:spcPts val="1000"/>
+              </a:spcBef>
+              <a:spcAft>
+                <a:spcPts val="0"/>
+              </a:spcAft>
+              <a:buSzPts val="1800"/>
+              <a:buChar char="🠶"/>
+            </a:pPr>
+            <a:r>
+              <a:rPr lang="en-US" dirty="0"/>
+              <a:t>Talk about probability</a:t>
+            </a:r>
+          </a:p>
+          <a:p>
+            <a:pPr marL="342900" lvl="0" indent="-342900" algn="l" rtl="0">
+              <a:spcBef>
+                <a:spcPts val="1000"/>
+              </a:spcBef>
+              <a:spcAft>
+                <a:spcPts val="0"/>
+              </a:spcAft>
+              <a:buSzPts val="1800"/>
+              <a:buChar char="🠶"/>
+            </a:pPr>
+            <a:r>
+              <a:rPr lang="en-US" dirty="0"/>
+              <a:t>Connect likelihood and/or probability to distributions</a:t>
+            </a:r>
+          </a:p>
+          <a:p>
+            <a:pPr marL="342900" lvl="0" indent="-342900" algn="l" rtl="0">
+              <a:spcBef>
+                <a:spcPts val="1000"/>
+              </a:spcBef>
+              <a:spcAft>
+                <a:spcPts val="0"/>
+              </a:spcAft>
+              <a:buSzPts val="1800"/>
+              <a:buChar char="🠶"/>
+            </a:pPr>
+            <a:r>
+              <a:rPr lang="en-US" dirty="0"/>
+              <a:t>Simulate different distributions</a:t>
+            </a:r>
+            <a:endParaRPr dirty="0"/>
+          </a:p>
+        </p:txBody>
+      </p:sp>
+    </p:spTree>
+  </p:cSld>
+  <p:clrMapOvr>
+    <a:masterClrMapping/>
+  </p:clrMapOvr>
+</p:sld>
+</file>
+
+<file path=ppt/slides/slide20.xml><?xml version="1.0" encoding="utf-8"?>
 <p:sld xmlns:a="http://schemas.openxmlformats.org/drawingml/2006/main" xmlns:r="http://schemas.openxmlformats.org/officeDocument/2006/relationships" xmlns:p="http://schemas.openxmlformats.org/presentationml/2006/main">
   <p:cSld>
     <p:spTree>
@@ -20304,212 +21015,7 @@
 </p:sld>
 </file>
 
-<file path=ppt/slides/slide2.xml><?xml version="1.0" encoding="utf-8"?>
-<p:sld xmlns:a="http://schemas.openxmlformats.org/drawingml/2006/main" xmlns:r="http://schemas.openxmlformats.org/officeDocument/2006/relationships" xmlns:p="http://schemas.openxmlformats.org/presentationml/2006/main">
-  <p:cSld>
-    <p:spTree>
-      <p:nvGrpSpPr>
-        <p:cNvPr id="1" name="Shape 173"/>
-        <p:cNvGrpSpPr/>
-        <p:nvPr/>
-      </p:nvGrpSpPr>
-      <p:grpSpPr>
-        <a:xfrm>
-          <a:off x="0" y="0"/>
-          <a:ext cx="0" cy="0"/>
-          <a:chOff x="0" y="0"/>
-          <a:chExt cx="0" cy="0"/>
-        </a:xfrm>
-      </p:grpSpPr>
-      <p:sp>
-        <p:nvSpPr>
-          <p:cNvPr id="174" name="Google Shape;174;p2"/>
-          <p:cNvSpPr txBox="1">
-            <a:spLocks noGrp="1"/>
-          </p:cNvSpPr>
-          <p:nvPr>
-            <p:ph type="title"/>
-          </p:nvPr>
-        </p:nvSpPr>
-        <p:spPr>
-          <a:xfrm>
-            <a:off x="2592925" y="624110"/>
-            <a:ext cx="8911687" cy="1280890"/>
-          </a:xfrm>
-          <a:prstGeom prst="rect">
-            <a:avLst/>
-          </a:prstGeom>
-          <a:noFill/>
-          <a:ln>
-            <a:noFill/>
-          </a:ln>
-        </p:spPr>
-        <p:txBody>
-          <a:bodyPr spcFirstLastPara="1" wrap="square" lIns="91425" tIns="45700" rIns="91425" bIns="45700" anchor="t" anchorCtr="0">
-            <a:normAutofit/>
-          </a:bodyPr>
-          <a:lstStyle/>
-          <a:p>
-            <a:pPr marL="0" lvl="0" indent="0" algn="l" rtl="0">
-              <a:spcBef>
-                <a:spcPts val="0"/>
-              </a:spcBef>
-              <a:spcAft>
-                <a:spcPts val="0"/>
-              </a:spcAft>
-              <a:buClr>
-                <a:srgbClr val="262626"/>
-              </a:buClr>
-              <a:buSzPts val="3600"/>
-              <a:buFont typeface="Century Gothic"/>
-              <a:buNone/>
-            </a:pPr>
-            <a:r>
-              <a:rPr lang="en-US"/>
-              <a:t>Today we’re going to:</a:t>
-            </a:r>
-            <a:endParaRPr/>
-          </a:p>
-        </p:txBody>
-      </p:sp>
-      <p:sp>
-        <p:nvSpPr>
-          <p:cNvPr id="175" name="Google Shape;175;p2"/>
-          <p:cNvSpPr txBox="1">
-            <a:spLocks noGrp="1"/>
-          </p:cNvSpPr>
-          <p:nvPr>
-            <p:ph type="body" idx="1"/>
-          </p:nvPr>
-        </p:nvSpPr>
-        <p:spPr>
-          <a:xfrm>
-            <a:off x="2589212" y="2133600"/>
-            <a:ext cx="8915400" cy="3777622"/>
-          </a:xfrm>
-          <a:prstGeom prst="rect">
-            <a:avLst/>
-          </a:prstGeom>
-          <a:noFill/>
-          <a:ln>
-            <a:noFill/>
-          </a:ln>
-        </p:spPr>
-        <p:txBody>
-          <a:bodyPr spcFirstLastPara="1" wrap="square" lIns="91425" tIns="45700" rIns="91425" bIns="45700" anchor="t" anchorCtr="0">
-            <a:normAutofit/>
-          </a:bodyPr>
-          <a:lstStyle/>
-          <a:p>
-            <a:pPr marL="342900" lvl="0" indent="-342900" algn="l" rtl="0">
-              <a:spcBef>
-                <a:spcPts val="0"/>
-              </a:spcBef>
-              <a:spcAft>
-                <a:spcPts val="0"/>
-              </a:spcAft>
-              <a:buSzPts val="1800"/>
-              <a:buChar char="🠶"/>
-            </a:pPr>
-            <a:r>
-              <a:rPr lang="en-US" dirty="0"/>
-              <a:t>Talk about distributions</a:t>
-            </a:r>
-            <a:endParaRPr dirty="0"/>
-          </a:p>
-          <a:p>
-            <a:pPr marL="342900" lvl="0" indent="-342900" algn="l" rtl="0">
-              <a:spcBef>
-                <a:spcPts val="1000"/>
-              </a:spcBef>
-              <a:spcAft>
-                <a:spcPts val="0"/>
-              </a:spcAft>
-              <a:buSzPts val="1800"/>
-              <a:buChar char="🠶"/>
-            </a:pPr>
-            <a:r>
-              <a:rPr lang="en-US" dirty="0"/>
-              <a:t>Discuss how to decide on a distribution</a:t>
-            </a:r>
-            <a:endParaRPr dirty="0"/>
-          </a:p>
-          <a:p>
-            <a:pPr marL="342900" lvl="0" indent="-342900" algn="l" rtl="0">
-              <a:spcBef>
-                <a:spcPts val="1000"/>
-              </a:spcBef>
-              <a:spcAft>
-                <a:spcPts val="0"/>
-              </a:spcAft>
-              <a:buSzPts val="1800"/>
-              <a:buChar char="🠶"/>
-            </a:pPr>
-            <a:r>
-              <a:rPr lang="en-US" dirty="0"/>
-              <a:t>Talk about likelihood</a:t>
-            </a:r>
-          </a:p>
-          <a:p>
-            <a:pPr marL="342900" lvl="0" indent="-342900" algn="l" rtl="0">
-              <a:spcBef>
-                <a:spcPts val="1000"/>
-              </a:spcBef>
-              <a:spcAft>
-                <a:spcPts val="0"/>
-              </a:spcAft>
-              <a:buSzPts val="1800"/>
-              <a:buChar char="🠶"/>
-            </a:pPr>
-            <a:r>
-              <a:rPr lang="en-US" dirty="0"/>
-              <a:t>Talk about probability</a:t>
-            </a:r>
-          </a:p>
-          <a:p>
-            <a:pPr marL="342900" lvl="0" indent="-342900" algn="l" rtl="0">
-              <a:spcBef>
-                <a:spcPts val="1000"/>
-              </a:spcBef>
-              <a:spcAft>
-                <a:spcPts val="0"/>
-              </a:spcAft>
-              <a:buSzPts val="1800"/>
-              <a:buChar char="🠶"/>
-            </a:pPr>
-            <a:r>
-              <a:rPr lang="en-US" dirty="0"/>
-              <a:t>Connect likelihood and/or probability to distributions</a:t>
-            </a:r>
-          </a:p>
-          <a:p>
-            <a:pPr marL="342900" lvl="0" indent="-342900" algn="l" rtl="0">
-              <a:spcBef>
-                <a:spcPts val="1000"/>
-              </a:spcBef>
-              <a:spcAft>
-                <a:spcPts val="0"/>
-              </a:spcAft>
-              <a:buSzPts val="1800"/>
-              <a:buChar char="🠶"/>
-            </a:pPr>
-            <a:r>
-              <a:rPr lang="en-US" dirty="0"/>
-              <a:t>Simulate different distributions</a:t>
-            </a:r>
-            <a:endParaRPr dirty="0"/>
-          </a:p>
-        </p:txBody>
-      </p:sp>
-    </p:spTree>
-  </p:cSld>
-  <p:clrMapOvr>
-    <a:masterClrMapping/>
-  </p:clrMapOvr>
-</p:sld>
-</file>
-
-<file path=ppt/slides/slide20.xml><?xml version="1.0" encoding="utf-8"?>
+<file path=ppt/slides/slide21.xml><?xml version="1.0" encoding="utf-8"?>
 <p:sld xmlns:a="http://schemas.openxmlformats.org/drawingml/2006/main" xmlns:r="http://schemas.openxmlformats.org/officeDocument/2006/relationships" xmlns:p="http://schemas.openxmlformats.org/presentationml/2006/main">
   <p:cSld>
     <p:spTree>
@@ -20592,7 +21098,7 @@
 </p:sld>
 </file>
 
-<file path=ppt/slides/slide21.xml><?xml version="1.0" encoding="utf-8"?>
+<file path=ppt/slides/slide22.xml><?xml version="1.0" encoding="utf-8"?>
 <p:sld xmlns:a="http://schemas.openxmlformats.org/drawingml/2006/main" xmlns:r="http://schemas.openxmlformats.org/officeDocument/2006/relationships" xmlns:p="http://schemas.openxmlformats.org/presentationml/2006/main">
   <p:cSld>
     <p:spTree>
@@ -20675,7 +21181,7 @@
 </p:sld>
 </file>
 
-<file path=ppt/slides/slide22.xml><?xml version="1.0" encoding="utf-8"?>
+<file path=ppt/slides/slide23.xml><?xml version="1.0" encoding="utf-8"?>
 <p:sld xmlns:a="http://schemas.openxmlformats.org/drawingml/2006/main" xmlns:r="http://schemas.openxmlformats.org/officeDocument/2006/relationships" xmlns:p="http://schemas.openxmlformats.org/presentationml/2006/main">
   <p:cSld>
     <p:spTree>
@@ -20758,7 +21264,7 @@
 </p:sld>
 </file>
 
-<file path=ppt/slides/slide23.xml><?xml version="1.0" encoding="utf-8"?>
+<file path=ppt/slides/slide24.xml><?xml version="1.0" encoding="utf-8"?>
 <p:sld xmlns:a="http://schemas.openxmlformats.org/drawingml/2006/main" xmlns:r="http://schemas.openxmlformats.org/officeDocument/2006/relationships" xmlns:p="http://schemas.openxmlformats.org/presentationml/2006/main">
   <p:cSld>
     <p:spTree>
@@ -20929,7 +21435,13 @@
   <p:cSld>
     <p:spTree>
       <p:nvGrpSpPr>
-        <p:cNvPr id="1" name=""/>
+        <p:cNvPr id="1" name="">
+          <a:extLst>
+            <a:ext uri="{FF2B5EF4-FFF2-40B4-BE49-F238E27FC236}">
+              <a16:creationId xmlns:a16="http://schemas.microsoft.com/office/drawing/2014/main" id="{87B81386-A809-596B-531E-30986A96BAA2}"/>
+            </a:ext>
+          </a:extLst>
+        </p:cNvPr>
         <p:cNvGrpSpPr/>
         <p:nvPr/>
       </p:nvGrpSpPr>
@@ -20946,7 +21458,7 @@
           <p:cNvPr id="2" name="Title 1">
             <a:extLst>
               <a:ext uri="{FF2B5EF4-FFF2-40B4-BE49-F238E27FC236}">
-                <a16:creationId xmlns:a16="http://schemas.microsoft.com/office/drawing/2014/main" id="{64DC8EA3-A0A7-6842-B50D-B6BA3ED3A18B}"/>
+                <a16:creationId xmlns:a16="http://schemas.microsoft.com/office/drawing/2014/main" id="{3AB6B824-5D92-13B9-9647-AEC331C2F497}"/>
               </a:ext>
             </a:extLst>
           </p:cNvPr>
@@ -20974,7 +21486,99 @@
           <p:cNvPr id="3" name="Text Placeholder 2">
             <a:extLst>
               <a:ext uri="{FF2B5EF4-FFF2-40B4-BE49-F238E27FC236}">
-                <a16:creationId xmlns:a16="http://schemas.microsoft.com/office/drawing/2014/main" id="{578CF221-220D-6449-A5CD-71DBF888CE75}"/>
+                <a16:creationId xmlns:a16="http://schemas.microsoft.com/office/drawing/2014/main" id="{988CCBAC-37B5-9788-242A-425F01FB8A1B}"/>
+              </a:ext>
+            </a:extLst>
+          </p:cNvPr>
+          <p:cNvSpPr>
+            <a:spLocks noGrp="1"/>
+          </p:cNvSpPr>
+          <p:nvPr>
+            <p:ph type="body" idx="1"/>
+          </p:nvPr>
+        </p:nvSpPr>
+        <p:spPr/>
+        <p:txBody>
+          <a:bodyPr/>
+          <a:lstStyle/>
+          <a:p>
+            <a:r>
+              <a:rPr lang="en-US" dirty="0"/>
+              <a:t>Where does your null expectation come from?</a:t>
+            </a:r>
+          </a:p>
+        </p:txBody>
+      </p:sp>
+    </p:spTree>
+    <p:extLst>
+      <p:ext uri="{BB962C8B-B14F-4D97-AF65-F5344CB8AC3E}">
+        <p14:creationId xmlns:p14="http://schemas.microsoft.com/office/powerpoint/2010/main" val="4132391813"/>
+      </p:ext>
+    </p:extLst>
+  </p:cSld>
+  <p:clrMapOvr>
+    <a:masterClrMapping/>
+  </p:clrMapOvr>
+</p:sld>
+</file>
+
+<file path=ppt/slides/slide5.xml><?xml version="1.0" encoding="utf-8"?>
+<p:sld xmlns:a="http://schemas.openxmlformats.org/drawingml/2006/main" xmlns:r="http://schemas.openxmlformats.org/officeDocument/2006/relationships" xmlns:p="http://schemas.openxmlformats.org/presentationml/2006/main">
+  <p:cSld>
+    <p:spTree>
+      <p:nvGrpSpPr>
+        <p:cNvPr id="1" name="">
+          <a:extLst>
+            <a:ext uri="{FF2B5EF4-FFF2-40B4-BE49-F238E27FC236}">
+              <a16:creationId xmlns:a16="http://schemas.microsoft.com/office/drawing/2014/main" id="{FC1F7D95-1EA9-BD14-4F6A-1AF234839151}"/>
+            </a:ext>
+          </a:extLst>
+        </p:cNvPr>
+        <p:cNvGrpSpPr/>
+        <p:nvPr/>
+      </p:nvGrpSpPr>
+      <p:grpSpPr>
+        <a:xfrm>
+          <a:off x="0" y="0"/>
+          <a:ext cx="0" cy="0"/>
+          <a:chOff x="0" y="0"/>
+          <a:chExt cx="0" cy="0"/>
+        </a:xfrm>
+      </p:grpSpPr>
+      <p:sp>
+        <p:nvSpPr>
+          <p:cNvPr id="2" name="Title 1">
+            <a:extLst>
+              <a:ext uri="{FF2B5EF4-FFF2-40B4-BE49-F238E27FC236}">
+                <a16:creationId xmlns:a16="http://schemas.microsoft.com/office/drawing/2014/main" id="{A5944B42-547A-48C0-4DA1-9BCDB0C982E4}"/>
+              </a:ext>
+            </a:extLst>
+          </p:cNvPr>
+          <p:cNvSpPr>
+            <a:spLocks noGrp="1"/>
+          </p:cNvSpPr>
+          <p:nvPr>
+            <p:ph type="title"/>
+          </p:nvPr>
+        </p:nvSpPr>
+        <p:spPr/>
+        <p:txBody>
+          <a:bodyPr/>
+          <a:lstStyle/>
+          <a:p>
+            <a:r>
+              <a:rPr lang="en-US" dirty="0"/>
+              <a:t>Why do we need to know about distributions?</a:t>
+            </a:r>
+          </a:p>
+        </p:txBody>
+      </p:sp>
+      <p:sp>
+        <p:nvSpPr>
+          <p:cNvPr id="3" name="Text Placeholder 2">
+            <a:extLst>
+              <a:ext uri="{FF2B5EF4-FFF2-40B4-BE49-F238E27FC236}">
+                <a16:creationId xmlns:a16="http://schemas.microsoft.com/office/drawing/2014/main" id="{BA5816E9-8AD0-5766-35B4-CCD0F22C3DF2}"/>
               </a:ext>
             </a:extLst>
           </p:cNvPr>
@@ -20998,7 +21602,7 @@
           <a:p>
             <a:r>
               <a:rPr lang="en-US" dirty="0"/>
-              <a:t>Make the point that many distributions are related to each other, or are special cases, etc. </a:t>
+              <a:t>What is the question that we’re typically asking in frequentist statistics?</a:t>
             </a:r>
           </a:p>
         </p:txBody>
@@ -21006,7 +21610,7 @@
     </p:spTree>
     <p:extLst>
       <p:ext uri="{BB962C8B-B14F-4D97-AF65-F5344CB8AC3E}">
-        <p14:creationId xmlns:p14="http://schemas.microsoft.com/office/powerpoint/2010/main" val="2119671251"/>
+        <p14:creationId xmlns:p14="http://schemas.microsoft.com/office/powerpoint/2010/main" val="2419263503"/>
       </p:ext>
     </p:extLst>
   </p:cSld>
@@ -21016,7 +21620,7 @@
 </p:sld>
 </file>
 
-<file path=ppt/slides/slide5.xml><?xml version="1.0" encoding="utf-8"?>
+<file path=ppt/slides/slide6.xml><?xml version="1.0" encoding="utf-8"?>
 <p:sld xmlns:a="http://schemas.openxmlformats.org/drawingml/2006/main" xmlns:r="http://schemas.openxmlformats.org/officeDocument/2006/relationships" xmlns:p="http://schemas.openxmlformats.org/presentationml/2006/main">
   <p:cSld>
     <p:spTree>
@@ -21114,7 +21718,7 @@
 </p:sld>
 </file>
 
-<file path=ppt/slides/slide6.xml><?xml version="1.0" encoding="utf-8"?>
+<file path=ppt/slides/slide7.xml><?xml version="1.0" encoding="utf-8"?>
 <p:sld xmlns:a="http://schemas.openxmlformats.org/drawingml/2006/main" xmlns:r="http://schemas.openxmlformats.org/officeDocument/2006/relationships" xmlns:p="http://schemas.openxmlformats.org/presentationml/2006/main">
   <p:cSld>
     <p:spTree>
@@ -21218,7 +21822,7 @@
 </p:sld>
 </file>
 
-<file path=ppt/slides/slide7.xml><?xml version="1.0" encoding="utf-8"?>
+<file path=ppt/slides/slide8.xml><?xml version="1.0" encoding="utf-8"?>
 <p:sld xmlns:a="http://schemas.openxmlformats.org/drawingml/2006/main" xmlns:r="http://schemas.openxmlformats.org/officeDocument/2006/relationships" xmlns:p="http://schemas.openxmlformats.org/presentationml/2006/main">
   <p:cSld>
     <p:spTree>
@@ -21298,7 +21902,7 @@
 </p:sld>
 </file>
 
-<file path=ppt/slides/slide8.xml><?xml version="1.0" encoding="utf-8"?>
+<file path=ppt/slides/slide9.xml><?xml version="1.0" encoding="utf-8"?>
 <p:sld xmlns:a="http://schemas.openxmlformats.org/drawingml/2006/main" xmlns:r="http://schemas.openxmlformats.org/officeDocument/2006/relationships" xmlns:p="http://schemas.openxmlformats.org/presentationml/2006/main">
   <p:cSld>
     <p:spTree>
@@ -21375,89 +21979,6 @@
     <p:extLst>
       <p:ext uri="{BB962C8B-B14F-4D97-AF65-F5344CB8AC3E}">
         <p14:creationId xmlns:p14="http://schemas.microsoft.com/office/powerpoint/2010/main" val="799775878"/>
-      </p:ext>
-    </p:extLst>
-  </p:cSld>
-  <p:clrMapOvr>
-    <a:masterClrMapping/>
-  </p:clrMapOvr>
-</p:sld>
-</file>
-
-<file path=ppt/slides/slide9.xml><?xml version="1.0" encoding="utf-8"?>
-<p:sld xmlns:a="http://schemas.openxmlformats.org/drawingml/2006/main" xmlns:r="http://schemas.openxmlformats.org/officeDocument/2006/relationships" xmlns:p="http://schemas.openxmlformats.org/presentationml/2006/main">
-  <p:cSld>
-    <p:spTree>
-      <p:nvGrpSpPr>
-        <p:cNvPr id="1" name=""/>
-        <p:cNvGrpSpPr/>
-        <p:nvPr/>
-      </p:nvGrpSpPr>
-      <p:grpSpPr>
-        <a:xfrm>
-          <a:off x="0" y="0"/>
-          <a:ext cx="0" cy="0"/>
-          <a:chOff x="0" y="0"/>
-          <a:chExt cx="0" cy="0"/>
-        </a:xfrm>
-      </p:grpSpPr>
-      <p:sp>
-        <p:nvSpPr>
-          <p:cNvPr id="2" name="Title 1">
-            <a:extLst>
-              <a:ext uri="{FF2B5EF4-FFF2-40B4-BE49-F238E27FC236}">
-                <a16:creationId xmlns:a16="http://schemas.microsoft.com/office/drawing/2014/main" id="{ECF3D682-41BC-A540-9EA3-A7D85DCC8270}"/>
-              </a:ext>
-            </a:extLst>
-          </p:cNvPr>
-          <p:cNvSpPr>
-            <a:spLocks noGrp="1"/>
-          </p:cNvSpPr>
-          <p:nvPr>
-            <p:ph type="title"/>
-          </p:nvPr>
-        </p:nvSpPr>
-        <p:spPr/>
-        <p:txBody>
-          <a:bodyPr/>
-          <a:lstStyle/>
-          <a:p>
-            <a:r>
-              <a:rPr lang="en-US" dirty="0"/>
-              <a:t>Normal/Gaussian</a:t>
-            </a:r>
-          </a:p>
-        </p:txBody>
-      </p:sp>
-      <p:sp>
-        <p:nvSpPr>
-          <p:cNvPr id="3" name="Text Placeholder 2">
-            <a:extLst>
-              <a:ext uri="{FF2B5EF4-FFF2-40B4-BE49-F238E27FC236}">
-                <a16:creationId xmlns:a16="http://schemas.microsoft.com/office/drawing/2014/main" id="{47926FC5-59C5-D84C-AEE0-3393CEBA1D34}"/>
-              </a:ext>
-            </a:extLst>
-          </p:cNvPr>
-          <p:cNvSpPr>
-            <a:spLocks noGrp="1"/>
-          </p:cNvSpPr>
-          <p:nvPr>
-            <p:ph type="body" idx="1"/>
-          </p:nvPr>
-        </p:nvSpPr>
-        <p:spPr/>
-        <p:txBody>
-          <a:bodyPr/>
-          <a:lstStyle/>
-          <a:p>
-            <a:endParaRPr lang="en-US"/>
-          </a:p>
-        </p:txBody>
-      </p:sp>
-    </p:spTree>
-    <p:extLst>
-      <p:ext uri="{BB962C8B-B14F-4D97-AF65-F5344CB8AC3E}">
-        <p14:creationId xmlns:p14="http://schemas.microsoft.com/office/powerpoint/2010/main" val="94847923"/>
       </p:ext>
     </p:extLst>
   </p:cSld>

</xml_diff>